<commit_message>
Reworked poster following review
</commit_message>
<xml_diff>
--- a/09-Poster/Poster.pptx
+++ b/09-Poster/Poster.pptx
@@ -4,8 +4,11 @@
   <p:sldMasterIdLst>
     <p:sldMasterId id="2147483708" r:id="rId1"/>
   </p:sldMasterIdLst>
+  <p:notesMasterIdLst>
+    <p:notesMasterId r:id="rId3"/>
+  </p:notesMasterIdLst>
   <p:sldIdLst>
-    <p:sldId id="256" r:id="rId2"/>
+    <p:sldId id="257" r:id="rId2"/>
   </p:sldIdLst>
   <p:sldSz cx="51206400" cy="28800425"/>
   <p:notesSz cx="6858000" cy="9144000"/>
@@ -109,13 +112,450 @@
       <p14:sectionLst xmlns:p14="http://schemas.microsoft.com/office/powerpoint/2010/main">
         <p14:section name="Untitled Section" id="{3EB669E6-6A40-41C4-934E-DDB96FE607C5}">
           <p14:sldIdLst>
-            <p14:sldId id="256"/>
+            <p14:sldId id="257"/>
           </p14:sldIdLst>
         </p14:section>
       </p14:sectionLst>
     </p:ext>
+    <p:ext uri="{EFAFB233-063F-42B5-8137-9DF3F51BA10A}">
+      <p15:sldGuideLst xmlns:p15="http://schemas.microsoft.com/office/powerpoint/2012/main"/>
+    </p:ext>
   </p:extLst>
 </p:presentation>
+</file>
+
+<file path=ppt/notesMasters/notesMaster1.xml><?xml version="1.0" encoding="utf-8"?>
+<p:notesMaster xmlns:a="http://schemas.openxmlformats.org/drawingml/2006/main" xmlns:r="http://schemas.openxmlformats.org/officeDocument/2006/relationships" xmlns:p="http://schemas.openxmlformats.org/presentationml/2006/main">
+  <p:cSld>
+    <p:bg>
+      <p:bgRef idx="1001">
+        <a:schemeClr val="bg1"/>
+      </p:bgRef>
+    </p:bg>
+    <p:spTree>
+      <p:nvGrpSpPr>
+        <p:cNvPr id="1" name=""/>
+        <p:cNvGrpSpPr/>
+        <p:nvPr/>
+      </p:nvGrpSpPr>
+      <p:grpSpPr>
+        <a:xfrm>
+          <a:off x="0" y="0"/>
+          <a:ext cx="0" cy="0"/>
+          <a:chOff x="0" y="0"/>
+          <a:chExt cx="0" cy="0"/>
+        </a:xfrm>
+      </p:grpSpPr>
+      <p:sp>
+        <p:nvSpPr>
+          <p:cNvPr id="2" name="Header Placeholder 1"/>
+          <p:cNvSpPr>
+            <a:spLocks noGrp="1"/>
+          </p:cNvSpPr>
+          <p:nvPr>
+            <p:ph type="hdr" sz="quarter"/>
+          </p:nvPr>
+        </p:nvSpPr>
+        <p:spPr>
+          <a:xfrm>
+            <a:off x="0" y="0"/>
+            <a:ext cx="2971800" cy="458788"/>
+          </a:xfrm>
+          <a:prstGeom prst="rect">
+            <a:avLst/>
+          </a:prstGeom>
+        </p:spPr>
+        <p:txBody>
+          <a:bodyPr vert="horz" lIns="91440" tIns="45720" rIns="91440" bIns="45720" rtlCol="0"/>
+          <a:lstStyle>
+            <a:lvl1pPr algn="l">
+              <a:defRPr sz="1200"/>
+            </a:lvl1pPr>
+          </a:lstStyle>
+          <a:p>
+            <a:endParaRPr lang="en-GB"/>
+          </a:p>
+        </p:txBody>
+      </p:sp>
+      <p:sp>
+        <p:nvSpPr>
+          <p:cNvPr id="3" name="Date Placeholder 2"/>
+          <p:cNvSpPr>
+            <a:spLocks noGrp="1"/>
+          </p:cNvSpPr>
+          <p:nvPr>
+            <p:ph type="dt" idx="1"/>
+          </p:nvPr>
+        </p:nvSpPr>
+        <p:spPr>
+          <a:xfrm>
+            <a:off x="3884613" y="0"/>
+            <a:ext cx="2971800" cy="458788"/>
+          </a:xfrm>
+          <a:prstGeom prst="rect">
+            <a:avLst/>
+          </a:prstGeom>
+        </p:spPr>
+        <p:txBody>
+          <a:bodyPr vert="horz" lIns="91440" tIns="45720" rIns="91440" bIns="45720" rtlCol="0"/>
+          <a:lstStyle>
+            <a:lvl1pPr algn="r">
+              <a:defRPr sz="1200"/>
+            </a:lvl1pPr>
+          </a:lstStyle>
+          <a:p>
+            <a:fld id="{B38512C7-A763-486F-A95C-9E9343E4FB04}" type="datetimeFigureOut">
+              <a:rPr lang="en-GB" smtClean="0"/>
+              <a:t>15/04/2024</a:t>
+            </a:fld>
+            <a:endParaRPr lang="en-GB"/>
+          </a:p>
+        </p:txBody>
+      </p:sp>
+      <p:sp>
+        <p:nvSpPr>
+          <p:cNvPr id="4" name="Slide Image Placeholder 3"/>
+          <p:cNvSpPr>
+            <a:spLocks noGrp="1" noRot="1" noChangeAspect="1"/>
+          </p:cNvSpPr>
+          <p:nvPr>
+            <p:ph type="sldImg" idx="2"/>
+          </p:nvPr>
+        </p:nvSpPr>
+        <p:spPr>
+          <a:xfrm>
+            <a:off x="685800" y="1143000"/>
+            <a:ext cx="5486400" cy="3086100"/>
+          </a:xfrm>
+          <a:prstGeom prst="rect">
+            <a:avLst/>
+          </a:prstGeom>
+          <a:noFill/>
+          <a:ln w="12700">
+            <a:solidFill>
+              <a:prstClr val="black"/>
+            </a:solidFill>
+          </a:ln>
+        </p:spPr>
+        <p:txBody>
+          <a:bodyPr vert="horz" lIns="91440" tIns="45720" rIns="91440" bIns="45720" rtlCol="0" anchor="ctr"/>
+          <a:lstStyle/>
+          <a:p>
+            <a:endParaRPr lang="en-GB"/>
+          </a:p>
+        </p:txBody>
+      </p:sp>
+      <p:sp>
+        <p:nvSpPr>
+          <p:cNvPr id="5" name="Notes Placeholder 4"/>
+          <p:cNvSpPr>
+            <a:spLocks noGrp="1"/>
+          </p:cNvSpPr>
+          <p:nvPr>
+            <p:ph type="body" sz="quarter" idx="3"/>
+          </p:nvPr>
+        </p:nvSpPr>
+        <p:spPr>
+          <a:xfrm>
+            <a:off x="685800" y="4400550"/>
+            <a:ext cx="5486400" cy="3600450"/>
+          </a:xfrm>
+          <a:prstGeom prst="rect">
+            <a:avLst/>
+          </a:prstGeom>
+        </p:spPr>
+        <p:txBody>
+          <a:bodyPr vert="horz" lIns="91440" tIns="45720" rIns="91440" bIns="45720" rtlCol="0"/>
+          <a:lstStyle/>
+          <a:p>
+            <a:pPr lvl="0"/>
+            <a:r>
+              <a:rPr lang="en-US"/>
+              <a:t>Click to edit Master text styles</a:t>
+            </a:r>
+          </a:p>
+          <a:p>
+            <a:pPr lvl="1"/>
+            <a:r>
+              <a:rPr lang="en-US"/>
+              <a:t>Second level</a:t>
+            </a:r>
+          </a:p>
+          <a:p>
+            <a:pPr lvl="2"/>
+            <a:r>
+              <a:rPr lang="en-US"/>
+              <a:t>Third level</a:t>
+            </a:r>
+          </a:p>
+          <a:p>
+            <a:pPr lvl="3"/>
+            <a:r>
+              <a:rPr lang="en-US"/>
+              <a:t>Fourth level</a:t>
+            </a:r>
+          </a:p>
+          <a:p>
+            <a:pPr lvl="4"/>
+            <a:r>
+              <a:rPr lang="en-US"/>
+              <a:t>Fifth level</a:t>
+            </a:r>
+            <a:endParaRPr lang="en-GB"/>
+          </a:p>
+        </p:txBody>
+      </p:sp>
+      <p:sp>
+        <p:nvSpPr>
+          <p:cNvPr id="6" name="Footer Placeholder 5"/>
+          <p:cNvSpPr>
+            <a:spLocks noGrp="1"/>
+          </p:cNvSpPr>
+          <p:nvPr>
+            <p:ph type="ftr" sz="quarter" idx="4"/>
+          </p:nvPr>
+        </p:nvSpPr>
+        <p:spPr>
+          <a:xfrm>
+            <a:off x="0" y="8685213"/>
+            <a:ext cx="2971800" cy="458787"/>
+          </a:xfrm>
+          <a:prstGeom prst="rect">
+            <a:avLst/>
+          </a:prstGeom>
+        </p:spPr>
+        <p:txBody>
+          <a:bodyPr vert="horz" lIns="91440" tIns="45720" rIns="91440" bIns="45720" rtlCol="0" anchor="b"/>
+          <a:lstStyle>
+            <a:lvl1pPr algn="l">
+              <a:defRPr sz="1200"/>
+            </a:lvl1pPr>
+          </a:lstStyle>
+          <a:p>
+            <a:endParaRPr lang="en-GB"/>
+          </a:p>
+        </p:txBody>
+      </p:sp>
+      <p:sp>
+        <p:nvSpPr>
+          <p:cNvPr id="7" name="Slide Number Placeholder 6"/>
+          <p:cNvSpPr>
+            <a:spLocks noGrp="1"/>
+          </p:cNvSpPr>
+          <p:nvPr>
+            <p:ph type="sldNum" sz="quarter" idx="5"/>
+          </p:nvPr>
+        </p:nvSpPr>
+        <p:spPr>
+          <a:xfrm>
+            <a:off x="3884613" y="8685213"/>
+            <a:ext cx="2971800" cy="458787"/>
+          </a:xfrm>
+          <a:prstGeom prst="rect">
+            <a:avLst/>
+          </a:prstGeom>
+        </p:spPr>
+        <p:txBody>
+          <a:bodyPr vert="horz" lIns="91440" tIns="45720" rIns="91440" bIns="45720" rtlCol="0" anchor="b"/>
+          <a:lstStyle>
+            <a:lvl1pPr algn="r">
+              <a:defRPr sz="1200"/>
+            </a:lvl1pPr>
+          </a:lstStyle>
+          <a:p>
+            <a:fld id="{9074A7BA-FA12-40F9-BF75-3D23FC590B85}" type="slidenum">
+              <a:rPr lang="en-GB" smtClean="0"/>
+              <a:t>‹#›</a:t>
+            </a:fld>
+            <a:endParaRPr lang="en-GB"/>
+          </a:p>
+        </p:txBody>
+      </p:sp>
+    </p:spTree>
+    <p:extLst>
+      <p:ext uri="{BB962C8B-B14F-4D97-AF65-F5344CB8AC3E}">
+        <p14:creationId xmlns:p14="http://schemas.microsoft.com/office/powerpoint/2010/main" val="3301659575"/>
+      </p:ext>
+    </p:extLst>
+  </p:cSld>
+  <p:clrMap bg1="lt1" tx1="dk1" bg2="lt2" tx2="dk2" accent1="accent1" accent2="accent2" accent3="accent3" accent4="accent4" accent5="accent5" accent6="accent6" hlink="hlink" folHlink="folHlink"/>
+  <p:notesStyle>
+    <a:lvl1pPr marL="0" algn="l" defTabSz="914400" rtl="0" eaLnBrk="1" latinLnBrk="0" hangingPunct="1">
+      <a:defRPr sz="1200" kern="1200">
+        <a:solidFill>
+          <a:schemeClr val="tx1"/>
+        </a:solidFill>
+        <a:latin typeface="+mn-lt"/>
+        <a:ea typeface="+mn-ea"/>
+        <a:cs typeface="+mn-cs"/>
+      </a:defRPr>
+    </a:lvl1pPr>
+    <a:lvl2pPr marL="457200" algn="l" defTabSz="914400" rtl="0" eaLnBrk="1" latinLnBrk="0" hangingPunct="1">
+      <a:defRPr sz="1200" kern="1200">
+        <a:solidFill>
+          <a:schemeClr val="tx1"/>
+        </a:solidFill>
+        <a:latin typeface="+mn-lt"/>
+        <a:ea typeface="+mn-ea"/>
+        <a:cs typeface="+mn-cs"/>
+      </a:defRPr>
+    </a:lvl2pPr>
+    <a:lvl3pPr marL="914400" algn="l" defTabSz="914400" rtl="0" eaLnBrk="1" latinLnBrk="0" hangingPunct="1">
+      <a:defRPr sz="1200" kern="1200">
+        <a:solidFill>
+          <a:schemeClr val="tx1"/>
+        </a:solidFill>
+        <a:latin typeface="+mn-lt"/>
+        <a:ea typeface="+mn-ea"/>
+        <a:cs typeface="+mn-cs"/>
+      </a:defRPr>
+    </a:lvl3pPr>
+    <a:lvl4pPr marL="1371600" algn="l" defTabSz="914400" rtl="0" eaLnBrk="1" latinLnBrk="0" hangingPunct="1">
+      <a:defRPr sz="1200" kern="1200">
+        <a:solidFill>
+          <a:schemeClr val="tx1"/>
+        </a:solidFill>
+        <a:latin typeface="+mn-lt"/>
+        <a:ea typeface="+mn-ea"/>
+        <a:cs typeface="+mn-cs"/>
+      </a:defRPr>
+    </a:lvl4pPr>
+    <a:lvl5pPr marL="1828800" algn="l" defTabSz="914400" rtl="0" eaLnBrk="1" latinLnBrk="0" hangingPunct="1">
+      <a:defRPr sz="1200" kern="1200">
+        <a:solidFill>
+          <a:schemeClr val="tx1"/>
+        </a:solidFill>
+        <a:latin typeface="+mn-lt"/>
+        <a:ea typeface="+mn-ea"/>
+        <a:cs typeface="+mn-cs"/>
+      </a:defRPr>
+    </a:lvl5pPr>
+    <a:lvl6pPr marL="2286000" algn="l" defTabSz="914400" rtl="0" eaLnBrk="1" latinLnBrk="0" hangingPunct="1">
+      <a:defRPr sz="1200" kern="1200">
+        <a:solidFill>
+          <a:schemeClr val="tx1"/>
+        </a:solidFill>
+        <a:latin typeface="+mn-lt"/>
+        <a:ea typeface="+mn-ea"/>
+        <a:cs typeface="+mn-cs"/>
+      </a:defRPr>
+    </a:lvl6pPr>
+    <a:lvl7pPr marL="2743200" algn="l" defTabSz="914400" rtl="0" eaLnBrk="1" latinLnBrk="0" hangingPunct="1">
+      <a:defRPr sz="1200" kern="1200">
+        <a:solidFill>
+          <a:schemeClr val="tx1"/>
+        </a:solidFill>
+        <a:latin typeface="+mn-lt"/>
+        <a:ea typeface="+mn-ea"/>
+        <a:cs typeface="+mn-cs"/>
+      </a:defRPr>
+    </a:lvl7pPr>
+    <a:lvl8pPr marL="3200400" algn="l" defTabSz="914400" rtl="0" eaLnBrk="1" latinLnBrk="0" hangingPunct="1">
+      <a:defRPr sz="1200" kern="1200">
+        <a:solidFill>
+          <a:schemeClr val="tx1"/>
+        </a:solidFill>
+        <a:latin typeface="+mn-lt"/>
+        <a:ea typeface="+mn-ea"/>
+        <a:cs typeface="+mn-cs"/>
+      </a:defRPr>
+    </a:lvl8pPr>
+    <a:lvl9pPr marL="3657600" algn="l" defTabSz="914400" rtl="0" eaLnBrk="1" latinLnBrk="0" hangingPunct="1">
+      <a:defRPr sz="1200" kern="1200">
+        <a:solidFill>
+          <a:schemeClr val="tx1"/>
+        </a:solidFill>
+        <a:latin typeface="+mn-lt"/>
+        <a:ea typeface="+mn-ea"/>
+        <a:cs typeface="+mn-cs"/>
+      </a:defRPr>
+    </a:lvl9pPr>
+  </p:notesStyle>
+</p:notesMaster>
+</file>
+
+<file path=ppt/notesSlides/notesSlide1.xml><?xml version="1.0" encoding="utf-8"?>
+<p:notes xmlns:a="http://schemas.openxmlformats.org/drawingml/2006/main" xmlns:r="http://schemas.openxmlformats.org/officeDocument/2006/relationships" xmlns:p="http://schemas.openxmlformats.org/presentationml/2006/main">
+  <p:cSld>
+    <p:spTree>
+      <p:nvGrpSpPr>
+        <p:cNvPr id="1" name=""/>
+        <p:cNvGrpSpPr/>
+        <p:nvPr/>
+      </p:nvGrpSpPr>
+      <p:grpSpPr>
+        <a:xfrm>
+          <a:off x="0" y="0"/>
+          <a:ext cx="0" cy="0"/>
+          <a:chOff x="0" y="0"/>
+          <a:chExt cx="0" cy="0"/>
+        </a:xfrm>
+      </p:grpSpPr>
+      <p:sp>
+        <p:nvSpPr>
+          <p:cNvPr id="2" name="Slide Image Placeholder 1"/>
+          <p:cNvSpPr>
+            <a:spLocks noGrp="1" noRot="1" noChangeAspect="1"/>
+          </p:cNvSpPr>
+          <p:nvPr>
+            <p:ph type="sldImg"/>
+          </p:nvPr>
+        </p:nvSpPr>
+        <p:spPr/>
+      </p:sp>
+      <p:sp>
+        <p:nvSpPr>
+          <p:cNvPr id="3" name="Notes Placeholder 2"/>
+          <p:cNvSpPr>
+            <a:spLocks noGrp="1"/>
+          </p:cNvSpPr>
+          <p:nvPr>
+            <p:ph type="body" idx="1"/>
+          </p:nvPr>
+        </p:nvSpPr>
+        <p:spPr/>
+        <p:txBody>
+          <a:bodyPr/>
+          <a:lstStyle/>
+          <a:p>
+            <a:endParaRPr lang="en-GB" dirty="0"/>
+          </a:p>
+        </p:txBody>
+      </p:sp>
+      <p:sp>
+        <p:nvSpPr>
+          <p:cNvPr id="4" name="Slide Number Placeholder 3"/>
+          <p:cNvSpPr>
+            <a:spLocks noGrp="1"/>
+          </p:cNvSpPr>
+          <p:nvPr>
+            <p:ph type="sldNum" sz="quarter" idx="5"/>
+          </p:nvPr>
+        </p:nvSpPr>
+        <p:spPr/>
+        <p:txBody>
+          <a:bodyPr/>
+          <a:lstStyle/>
+          <a:p>
+            <a:fld id="{9074A7BA-FA12-40F9-BF75-3D23FC590B85}" type="slidenum">
+              <a:rPr lang="en-GB" smtClean="0"/>
+              <a:t>1</a:t>
+            </a:fld>
+            <a:endParaRPr lang="en-GB"/>
+          </a:p>
+        </p:txBody>
+      </p:sp>
+    </p:spTree>
+    <p:extLst>
+      <p:ext uri="{BB962C8B-B14F-4D97-AF65-F5344CB8AC3E}">
+        <p14:creationId xmlns:p14="http://schemas.microsoft.com/office/powerpoint/2010/main" val="813670562"/>
+      </p:ext>
+    </p:extLst>
+  </p:cSld>
+  <p:clrMapOvr>
+    <a:masterClrMapping/>
+  </p:clrMapOvr>
+</p:notes>
 </file>
 
 <file path=ppt/slideLayouts/slideLayout1.xml><?xml version="1.0" encoding="utf-8"?>
@@ -249,7 +689,7 @@
           <a:p>
             <a:fld id="{D1C0F08E-D79B-4B72-85FC-B6C57194A010}" type="datetimeFigureOut">
               <a:rPr lang="en-GB" smtClean="0"/>
-              <a:t>11/04/2024</a:t>
+              <a:t>15/04/2024</a:t>
             </a:fld>
             <a:endParaRPr lang="en-GB"/>
           </a:p>
@@ -419,7 +859,7 @@
           <a:p>
             <a:fld id="{D1C0F08E-D79B-4B72-85FC-B6C57194A010}" type="datetimeFigureOut">
               <a:rPr lang="en-GB" smtClean="0"/>
-              <a:t>11/04/2024</a:t>
+              <a:t>15/04/2024</a:t>
             </a:fld>
             <a:endParaRPr lang="en-GB"/>
           </a:p>
@@ -599,7 +1039,7 @@
           <a:p>
             <a:fld id="{D1C0F08E-D79B-4B72-85FC-B6C57194A010}" type="datetimeFigureOut">
               <a:rPr lang="en-GB" smtClean="0"/>
-              <a:t>11/04/2024</a:t>
+              <a:t>15/04/2024</a:t>
             </a:fld>
             <a:endParaRPr lang="en-GB"/>
           </a:p>
@@ -769,7 +1209,7 @@
           <a:p>
             <a:fld id="{D1C0F08E-D79B-4B72-85FC-B6C57194A010}" type="datetimeFigureOut">
               <a:rPr lang="en-GB" smtClean="0"/>
-              <a:t>11/04/2024</a:t>
+              <a:t>15/04/2024</a:t>
             </a:fld>
             <a:endParaRPr lang="en-GB"/>
           </a:p>
@@ -1015,7 +1455,7 @@
           <a:p>
             <a:fld id="{D1C0F08E-D79B-4B72-85FC-B6C57194A010}" type="datetimeFigureOut">
               <a:rPr lang="en-GB" smtClean="0"/>
-              <a:t>11/04/2024</a:t>
+              <a:t>15/04/2024</a:t>
             </a:fld>
             <a:endParaRPr lang="en-GB"/>
           </a:p>
@@ -1247,7 +1687,7 @@
           <a:p>
             <a:fld id="{D1C0F08E-D79B-4B72-85FC-B6C57194A010}" type="datetimeFigureOut">
               <a:rPr lang="en-GB" smtClean="0"/>
-              <a:t>11/04/2024</a:t>
+              <a:t>15/04/2024</a:t>
             </a:fld>
             <a:endParaRPr lang="en-GB"/>
           </a:p>
@@ -1614,7 +2054,7 @@
           <a:p>
             <a:fld id="{D1C0F08E-D79B-4B72-85FC-B6C57194A010}" type="datetimeFigureOut">
               <a:rPr lang="en-GB" smtClean="0"/>
-              <a:t>11/04/2024</a:t>
+              <a:t>15/04/2024</a:t>
             </a:fld>
             <a:endParaRPr lang="en-GB"/>
           </a:p>
@@ -1732,7 +2172,7 @@
           <a:p>
             <a:fld id="{D1C0F08E-D79B-4B72-85FC-B6C57194A010}" type="datetimeFigureOut">
               <a:rPr lang="en-GB" smtClean="0"/>
-              <a:t>11/04/2024</a:t>
+              <a:t>15/04/2024</a:t>
             </a:fld>
             <a:endParaRPr lang="en-GB"/>
           </a:p>
@@ -1827,7 +2267,7 @@
           <a:p>
             <a:fld id="{D1C0F08E-D79B-4B72-85FC-B6C57194A010}" type="datetimeFigureOut">
               <a:rPr lang="en-GB" smtClean="0"/>
-              <a:t>11/04/2024</a:t>
+              <a:t>15/04/2024</a:t>
             </a:fld>
             <a:endParaRPr lang="en-GB"/>
           </a:p>
@@ -2104,7 +2544,7 @@
           <a:p>
             <a:fld id="{D1C0F08E-D79B-4B72-85FC-B6C57194A010}" type="datetimeFigureOut">
               <a:rPr lang="en-GB" smtClean="0"/>
-              <a:t>11/04/2024</a:t>
+              <a:t>15/04/2024</a:t>
             </a:fld>
             <a:endParaRPr lang="en-GB"/>
           </a:p>
@@ -2361,7 +2801,7 @@
           <a:p>
             <a:fld id="{D1C0F08E-D79B-4B72-85FC-B6C57194A010}" type="datetimeFigureOut">
               <a:rPr lang="en-GB" smtClean="0"/>
-              <a:t>11/04/2024</a:t>
+              <a:t>15/04/2024</a:t>
             </a:fld>
             <a:endParaRPr lang="en-GB"/>
           </a:p>
@@ -2574,7 +3014,7 @@
           <a:p>
             <a:fld id="{D1C0F08E-D79B-4B72-85FC-B6C57194A010}" type="datetimeFigureOut">
               <a:rPr lang="en-GB" smtClean="0"/>
-              <a:t>11/04/2024</a:t>
+              <a:t>15/04/2024</a:t>
             </a:fld>
             <a:endParaRPr lang="en-GB"/>
           </a:p>
@@ -3005,7 +3445,7 @@
         </p:nvSpPr>
         <p:spPr>
           <a:xfrm>
-            <a:off x="21337119" y="-1016806"/>
+            <a:off x="1797419" y="-975619"/>
             <a:ext cx="24623719" cy="5102948"/>
           </a:xfrm>
           <a:prstGeom prst="roundRect">
@@ -3116,14 +3556,14 @@
           <p:nvPr/>
         </p:nvPicPr>
         <p:blipFill>
-          <a:blip r:embed="rId2"/>
+          <a:blip r:embed="rId3"/>
           <a:stretch>
             <a:fillRect/>
           </a:stretch>
         </p:blipFill>
         <p:spPr>
           <a:xfrm>
-            <a:off x="1559860" y="4978414"/>
+            <a:off x="33238400" y="951566"/>
             <a:ext cx="17023976" cy="11998994"/>
           </a:xfrm>
           <a:prstGeom prst="rect">
@@ -3256,7 +3696,7 @@
           <p:nvPr/>
         </p:nvPicPr>
         <p:blipFill>
-          <a:blip r:embed="rId3">
+          <a:blip r:embed="rId4">
             <a:extLst>
               <a:ext uri="{28A0092B-C50C-407E-A947-70E740481C1C}">
                 <a14:useLocalDpi xmlns:a14="http://schemas.microsoft.com/office/drawing/2010/main" val="0"/>
@@ -3407,8 +3847,8 @@
         </p:nvSpPr>
         <p:spPr>
           <a:xfrm>
-            <a:off x="19605811" y="5364177"/>
-            <a:ext cx="30040729" cy="9941183"/>
+            <a:off x="1797419" y="5149345"/>
+            <a:ext cx="30040729" cy="21021139"/>
           </a:xfrm>
           <a:prstGeom prst="rect">
             <a:avLst/>
@@ -3441,22 +3881,7 @@
                 <a:latin typeface="Lucida Sans Unicode" panose="020B0602030504020204" pitchFamily="34" charset="0"/>
                 <a:cs typeface="Lucida Sans Unicode" panose="020B0602030504020204" pitchFamily="34" charset="0"/>
               </a:rPr>
-              <a:t>As an archer and club committee member myself, I recognised the need for a tool that could be easily used to track owned items and their conditions for the purpose of maintenance and budget allocation for replacement equipment, for both individuals and clubs within the archery community, or even other sports communities.</a:t>
-            </a:r>
-          </a:p>
-          <a:p>
-            <a:endParaRPr lang="en-GB" sz="4000" dirty="0">
-              <a:latin typeface="Lucida Sans Unicode" panose="020B0602030504020204" pitchFamily="34" charset="0"/>
-              <a:cs typeface="Lucida Sans Unicode" panose="020B0602030504020204" pitchFamily="34" charset="0"/>
-            </a:endParaRPr>
-          </a:p>
-          <a:p>
-            <a:r>
-              <a:rPr lang="en-GB" sz="4000" dirty="0">
-                <a:latin typeface="Lucida Sans Unicode" panose="020B0602030504020204" pitchFamily="34" charset="0"/>
-                <a:cs typeface="Lucida Sans Unicode" panose="020B0602030504020204" pitchFamily="34" charset="0"/>
-              </a:rPr>
-              <a:t>ArrowTrack was designed with the goal of addressing these needs.</a:t>
+              <a:t>As an archer and club committee member myself, I recognised the need for a tool that could be easily used to track owned items and their conditions for the purpose of maintenance and budget allocation for replacement equipment, for both individuals and clubs within the archery community, or even other sports communities. ArrowTrack was designed with the goal of addressing these needs.</a:t>
             </a:r>
           </a:p>
           <a:p>
@@ -3481,13 +3906,198 @@
             </a:endParaRPr>
           </a:p>
           <a:p>
+            <a:pPr marL="571500" indent="-571500">
+              <a:buFont typeface="Arial" panose="020B0604020202020204" pitchFamily="34" charset="0"/>
+              <a:buChar char="•"/>
+            </a:pPr>
             <a:r>
               <a:rPr lang="en-GB" sz="4000" dirty="0">
                 <a:latin typeface="Lucida Sans Unicode" panose="020B0602030504020204" pitchFamily="34" charset="0"/>
                 <a:cs typeface="Lucida Sans Unicode" panose="020B0602030504020204" pitchFamily="34" charset="0"/>
               </a:rPr>
-              <a:t>For individuals, the application provides a tool to monitor the condition of their equipment, ensuring longevity and performance, thus saving money in the long term on damages. For clubs, where club-owned equipment can be spread across multiple indoor and outdoor ranges, or on loan out to club members trialling different bow setups, the ArrowTrack tool can be used to manage this in one centralised tool. ArrowTrack’s total cost and by-location cost functionalities can be especially helpful to club treasurers and equipment officers, assisting in insurance estimations and budget planning.</a:t>
-            </a:r>
+              <a:t>For individuals, the application provides a tool to monitor the condition of their equipment, ensuring longevity and performance, thus saving money in the long term on damages. </a:t>
+            </a:r>
+          </a:p>
+          <a:p>
+            <a:pPr marL="571500" indent="-571500">
+              <a:buFont typeface="Arial" panose="020B0604020202020204" pitchFamily="34" charset="0"/>
+              <a:buChar char="•"/>
+            </a:pPr>
+            <a:r>
+              <a:rPr lang="en-GB" sz="4000" dirty="0">
+                <a:latin typeface="Lucida Sans Unicode" panose="020B0602030504020204" pitchFamily="34" charset="0"/>
+                <a:cs typeface="Lucida Sans Unicode" panose="020B0602030504020204" pitchFamily="34" charset="0"/>
+              </a:rPr>
+              <a:t>For clubs, where club-owned equipment can be spread across multiple indoor and outdoor ranges, or on loan out to club members trialling different bow setups, the ArrowTrack tool can be used to manage this in one centralised tool. </a:t>
+            </a:r>
+          </a:p>
+          <a:p>
+            <a:pPr marL="571500" indent="-571500">
+              <a:buFont typeface="Arial" panose="020B0604020202020204" pitchFamily="34" charset="0"/>
+              <a:buChar char="•"/>
+            </a:pPr>
+            <a:r>
+              <a:rPr lang="en-GB" sz="4000" dirty="0">
+                <a:latin typeface="Lucida Sans Unicode" panose="020B0602030504020204" pitchFamily="34" charset="0"/>
+                <a:cs typeface="Lucida Sans Unicode" panose="020B0602030504020204" pitchFamily="34" charset="0"/>
+              </a:rPr>
+              <a:t>ArrowTrack’s total cost and by-location cost functionalities can be especially helpful to club treasurers and equipment officers, assisting in insurance estimations and budget planning.</a:t>
+            </a:r>
+          </a:p>
+          <a:p>
+            <a:endParaRPr lang="en-GB" sz="4000" b="1" dirty="0">
+              <a:latin typeface="Lucida Sans Unicode" panose="020B0602030504020204" pitchFamily="34" charset="0"/>
+              <a:cs typeface="Lucida Sans Unicode" panose="020B0602030504020204" pitchFamily="34" charset="0"/>
+            </a:endParaRPr>
+          </a:p>
+          <a:p>
+            <a:r>
+              <a:rPr lang="en-GB" sz="4000" b="1" dirty="0">
+                <a:latin typeface="Lucida Sans Unicode" panose="020B0602030504020204" pitchFamily="34" charset="0"/>
+                <a:cs typeface="Lucida Sans Unicode" panose="020B0602030504020204" pitchFamily="34" charset="0"/>
+              </a:rPr>
+              <a:t>TECHNOLOGY</a:t>
+            </a:r>
+          </a:p>
+          <a:p>
+            <a:endParaRPr lang="en-GB" sz="4000" b="1" dirty="0">
+              <a:latin typeface="Lucida Sans Unicode" panose="020B0602030504020204" pitchFamily="34" charset="0"/>
+              <a:cs typeface="Lucida Sans Unicode" panose="020B0602030504020204" pitchFamily="34" charset="0"/>
+            </a:endParaRPr>
+          </a:p>
+          <a:p>
+            <a:r>
+              <a:rPr lang="en-GB" sz="4000" dirty="0">
+                <a:latin typeface="Lucida Sans Unicode" panose="020B0602030504020204" pitchFamily="34" charset="0"/>
+                <a:cs typeface="Lucida Sans Unicode" panose="020B0602030504020204" pitchFamily="34" charset="0"/>
+              </a:rPr>
+              <a:t>ArrowTrack implements a single-page application (SPA) </a:t>
+            </a:r>
+          </a:p>
+          <a:p>
+            <a:r>
+              <a:rPr lang="en-GB" sz="4000" dirty="0">
+                <a:latin typeface="Lucida Sans Unicode" panose="020B0602030504020204" pitchFamily="34" charset="0"/>
+                <a:cs typeface="Lucida Sans Unicode" panose="020B0602030504020204" pitchFamily="34" charset="0"/>
+              </a:rPr>
+              <a:t>architecture to provide a seamless and responsive user </a:t>
+            </a:r>
+          </a:p>
+          <a:p>
+            <a:r>
+              <a:rPr lang="en-GB" sz="4000" dirty="0">
+                <a:latin typeface="Lucida Sans Unicode" panose="020B0602030504020204" pitchFamily="34" charset="0"/>
+                <a:cs typeface="Lucida Sans Unicode" panose="020B0602030504020204" pitchFamily="34" charset="0"/>
+              </a:rPr>
+              <a:t>experience, designed to act as a database front-end. The user’s</a:t>
+            </a:r>
+          </a:p>
+          <a:p>
+            <a:r>
+              <a:rPr lang="en-GB" sz="4000" dirty="0">
+                <a:latin typeface="Lucida Sans Unicode" panose="020B0602030504020204" pitchFamily="34" charset="0"/>
+                <a:cs typeface="Lucida Sans Unicode" panose="020B0602030504020204" pitchFamily="34" charset="0"/>
+              </a:rPr>
+              <a:t>data is stored locally, client-side, ensuring data privacy and</a:t>
+            </a:r>
+          </a:p>
+          <a:p>
+            <a:r>
+              <a:rPr lang="en-GB" sz="4000" dirty="0">
+                <a:latin typeface="Lucida Sans Unicode" panose="020B0602030504020204" pitchFamily="34" charset="0"/>
+                <a:cs typeface="Lucida Sans Unicode" panose="020B0602030504020204" pitchFamily="34" charset="0"/>
+              </a:rPr>
+              <a:t>confidentiality without the requirement of server-side databases. </a:t>
+            </a:r>
+          </a:p>
+          <a:p>
+            <a:r>
+              <a:rPr lang="en-GB" sz="4000" dirty="0">
+                <a:latin typeface="Lucida Sans Unicode" panose="020B0602030504020204" pitchFamily="34" charset="0"/>
+                <a:cs typeface="Lucida Sans Unicode" panose="020B0602030504020204" pitchFamily="34" charset="0"/>
+              </a:rPr>
+              <a:t>This allows ArrowTrack to function anywhere, even in locations </a:t>
+            </a:r>
+          </a:p>
+          <a:p>
+            <a:r>
+              <a:rPr lang="en-GB" sz="4000" dirty="0">
+                <a:latin typeface="Lucida Sans Unicode" panose="020B0602030504020204" pitchFamily="34" charset="0"/>
+                <a:cs typeface="Lucida Sans Unicode" panose="020B0602030504020204" pitchFamily="34" charset="0"/>
+              </a:rPr>
+              <a:t>without internet access such as remote archery ranges, ensuring</a:t>
+            </a:r>
+          </a:p>
+          <a:p>
+            <a:r>
+              <a:rPr lang="en-GB" sz="4000" dirty="0">
+                <a:latin typeface="Lucida Sans Unicode" panose="020B0602030504020204" pitchFamily="34" charset="0"/>
+                <a:cs typeface="Lucida Sans Unicode" panose="020B0602030504020204" pitchFamily="34" charset="0"/>
+              </a:rPr>
+              <a:t> accessibility despite location.</a:t>
+            </a:r>
+          </a:p>
+          <a:p>
+            <a:endParaRPr lang="en-GB" sz="4000" dirty="0">
+              <a:latin typeface="Lucida Sans Unicode" panose="020B0602030504020204" pitchFamily="34" charset="0"/>
+              <a:cs typeface="Lucida Sans Unicode" panose="020B0602030504020204" pitchFamily="34" charset="0"/>
+            </a:endParaRPr>
+          </a:p>
+          <a:p>
+            <a:r>
+              <a:rPr lang="en-GB" sz="4000" dirty="0">
+                <a:latin typeface="Lucida Sans Unicode" panose="020B0602030504020204" pitchFamily="34" charset="0"/>
+                <a:cs typeface="Lucida Sans Unicode" panose="020B0602030504020204" pitchFamily="34" charset="0"/>
+              </a:rPr>
+              <a:t>HTML, CSS, JavaScript and jQuery were the core building blocks used </a:t>
+            </a:r>
+          </a:p>
+          <a:p>
+            <a:r>
+              <a:rPr lang="en-GB" sz="4000" dirty="0">
+                <a:latin typeface="Lucida Sans Unicode" panose="020B0602030504020204" pitchFamily="34" charset="0"/>
+                <a:cs typeface="Lucida Sans Unicode" panose="020B0602030504020204" pitchFamily="34" charset="0"/>
+              </a:rPr>
+              <a:t>												to create the structure, style and functionality </a:t>
+            </a:r>
+          </a:p>
+          <a:p>
+            <a:r>
+              <a:rPr lang="en-GB" sz="4000" dirty="0">
+                <a:latin typeface="Lucida Sans Unicode" panose="020B0602030504020204" pitchFamily="34" charset="0"/>
+                <a:cs typeface="Lucida Sans Unicode" panose="020B0602030504020204" pitchFamily="34" charset="0"/>
+              </a:rPr>
+              <a:t>												of this SPA, chosen for their compatibility with</a:t>
+            </a:r>
+          </a:p>
+          <a:p>
+            <a:r>
+              <a:rPr lang="en-GB" sz="4000" dirty="0">
+                <a:latin typeface="Lucida Sans Unicode" panose="020B0602030504020204" pitchFamily="34" charset="0"/>
+                <a:cs typeface="Lucida Sans Unicode" panose="020B0602030504020204" pitchFamily="34" charset="0"/>
+              </a:rPr>
+              <a:t>												modern web development, and their ability to</a:t>
+            </a:r>
+          </a:p>
+          <a:p>
+            <a:r>
+              <a:rPr lang="en-GB" sz="4000" dirty="0">
+                <a:latin typeface="Lucida Sans Unicode" panose="020B0602030504020204" pitchFamily="34" charset="0"/>
+                <a:cs typeface="Lucida Sans Unicode" panose="020B0602030504020204" pitchFamily="34" charset="0"/>
+              </a:rPr>
+              <a:t>												load content dynamically within the single</a:t>
+            </a:r>
+          </a:p>
+          <a:p>
+            <a:r>
+              <a:rPr lang="en-GB" sz="4000" dirty="0">
+                <a:latin typeface="Lucida Sans Unicode" panose="020B0602030504020204" pitchFamily="34" charset="0"/>
+                <a:cs typeface="Lucida Sans Unicode" panose="020B0602030504020204" pitchFamily="34" charset="0"/>
+              </a:rPr>
+              <a:t>												page application architecture.</a:t>
+            </a:r>
+          </a:p>
+          <a:p>
             <a:endParaRPr lang="en-GB" sz="4000" b="1" dirty="0">
               <a:latin typeface="Lucida Sans Unicode" panose="020B0602030504020204" pitchFamily="34" charset="0"/>
               <a:cs typeface="Lucida Sans Unicode" panose="020B0602030504020204" pitchFamily="34" charset="0"/>
@@ -3509,8 +4119,8 @@
         </p:nvSpPr>
         <p:spPr>
           <a:xfrm>
-            <a:off x="25971312" y="3631710"/>
-            <a:ext cx="15355332" cy="908864"/>
+            <a:off x="4923534" y="3514108"/>
+            <a:ext cx="18371488" cy="1081980"/>
           </a:xfrm>
           <a:prstGeom prst="roundRect">
             <a:avLst>
@@ -3529,7 +4139,7 @@
           <a:p>
             <a:pPr algn="ctr"/>
             <a:r>
-              <a:rPr lang="en-GB" sz="3600" dirty="0">
+              <a:rPr lang="en-GB" sz="4400" dirty="0">
                 <a:solidFill>
                   <a:schemeClr val="bg1"/>
                 </a:solidFill>
@@ -3539,7 +4149,7 @@
               <a:t>Inventory Management System for </a:t>
             </a:r>
             <a:r>
-              <a:rPr lang="en-GB" sz="3600" dirty="0">
+              <a:rPr lang="en-GB" sz="4400" dirty="0">
                 <a:solidFill>
                   <a:srgbClr val="FFFF00"/>
                 </a:solidFill>
@@ -3549,7 +4159,7 @@
               <a:t>Archers</a:t>
             </a:r>
             <a:r>
-              <a:rPr lang="en-GB" sz="3600" dirty="0">
+              <a:rPr lang="en-GB" sz="4400" dirty="0">
                 <a:solidFill>
                   <a:schemeClr val="bg1"/>
                 </a:solidFill>
@@ -3559,7 +4169,7 @@
               <a:t> and </a:t>
             </a:r>
             <a:r>
-              <a:rPr lang="en-GB" sz="3600" dirty="0">
+              <a:rPr lang="en-GB" sz="4400" dirty="0">
                 <a:solidFill>
                   <a:srgbClr val="FFFF00"/>
                 </a:solidFill>
@@ -3567,83 +4177,6 @@
                 <a:cs typeface="Lucida Sans Unicode" panose="020B0602030504020204" pitchFamily="34" charset="0"/>
               </a:rPr>
               <a:t>Archery Clubs</a:t>
-            </a:r>
-          </a:p>
-        </p:txBody>
-      </p:sp>
-      <p:sp>
-        <p:nvSpPr>
-          <p:cNvPr id="17" name="TextBox 16">
-            <a:extLst>
-              <a:ext uri="{FF2B5EF4-FFF2-40B4-BE49-F238E27FC236}">
-                <a16:creationId xmlns:a16="http://schemas.microsoft.com/office/drawing/2014/main" id="{3FEAD824-F1CA-D0F0-6AED-4C9C25FD2978}"/>
-              </a:ext>
-            </a:extLst>
-          </p:cNvPr>
-          <p:cNvSpPr txBox="1"/>
-          <p:nvPr/>
-        </p:nvSpPr>
-        <p:spPr>
-          <a:xfrm>
-            <a:off x="1667433" y="17266583"/>
-            <a:ext cx="17610813" cy="8094524"/>
-          </a:xfrm>
-          <a:prstGeom prst="rect">
-            <a:avLst/>
-          </a:prstGeom>
-          <a:noFill/>
-        </p:spPr>
-        <p:txBody>
-          <a:bodyPr wrap="square" rtlCol="0">
-            <a:spAutoFit/>
-          </a:bodyPr>
-          <a:lstStyle/>
-          <a:p>
-            <a:r>
-              <a:rPr lang="en-GB" sz="4000" b="1" dirty="0">
-                <a:latin typeface="Lucida Sans Unicode" panose="020B0602030504020204" pitchFamily="34" charset="0"/>
-                <a:cs typeface="Lucida Sans Unicode" panose="020B0602030504020204" pitchFamily="34" charset="0"/>
-              </a:rPr>
-              <a:t>TECHNOLOGY</a:t>
-            </a:r>
-          </a:p>
-          <a:p>
-            <a:endParaRPr lang="en-GB" sz="4000" b="1" dirty="0">
-              <a:latin typeface="Lucida Sans Unicode" panose="020B0602030504020204" pitchFamily="34" charset="0"/>
-              <a:cs typeface="Lucida Sans Unicode" panose="020B0602030504020204" pitchFamily="34" charset="0"/>
-            </a:endParaRPr>
-          </a:p>
-          <a:p>
-            <a:r>
-              <a:rPr lang="en-GB" sz="4000" dirty="0">
-                <a:latin typeface="Lucida Sans Unicode" panose="020B0602030504020204" pitchFamily="34" charset="0"/>
-                <a:cs typeface="Lucida Sans Unicode" panose="020B0602030504020204" pitchFamily="34" charset="0"/>
-              </a:rPr>
-              <a:t>ArrowTrack implements a single-page application (SPA) architecture to provide a seamless and responsive user experience, designed to act as a database front-end. All of the user’s data is stored locally, client-side, ensuring data privacy and confidentiality without the requirement of server-side databases. This allows ArrowTrack to function anywhere, even in locations without internet access such as remote archery ranges, ensuring accessibility despite location.</a:t>
-            </a:r>
-          </a:p>
-          <a:p>
-            <a:endParaRPr lang="en-GB" sz="4000" dirty="0">
-              <a:latin typeface="Lucida Sans Unicode" panose="020B0602030504020204" pitchFamily="34" charset="0"/>
-              <a:cs typeface="Lucida Sans Unicode" panose="020B0602030504020204" pitchFamily="34" charset="0"/>
-            </a:endParaRPr>
-          </a:p>
-          <a:p>
-            <a:r>
-              <a:rPr lang="en-GB" sz="4000" dirty="0">
-                <a:latin typeface="Lucida Sans Unicode" panose="020B0602030504020204" pitchFamily="34" charset="0"/>
-                <a:cs typeface="Lucida Sans Unicode" panose="020B0602030504020204" pitchFamily="34" charset="0"/>
-              </a:rPr>
-              <a:t>												HTML, CSS, JavaScript and jQuery were the core 													building blocks used to create the structure, </a:t>
-            </a:r>
-          </a:p>
-          <a:p>
-            <a:r>
-              <a:rPr lang="en-GB" sz="4000" dirty="0">
-                <a:latin typeface="Lucida Sans Unicode" panose="020B0602030504020204" pitchFamily="34" charset="0"/>
-                <a:cs typeface="Lucida Sans Unicode" panose="020B0602030504020204" pitchFamily="34" charset="0"/>
-              </a:rPr>
-              <a:t>												style and functionality of this SPA.</a:t>
             </a:r>
           </a:p>
         </p:txBody>
@@ -3662,7 +4195,7 @@
         </p:nvSpPr>
         <p:spPr>
           <a:xfrm>
-            <a:off x="19605811" y="15709447"/>
+            <a:off x="19605811" y="14921160"/>
             <a:ext cx="17938378" cy="4401205"/>
           </a:xfrm>
           <a:prstGeom prst="rect">
@@ -3696,7 +4229,16 @@
                 <a:latin typeface="Lucida Sans Unicode" panose="020B0602030504020204" pitchFamily="34" charset="0"/>
                 <a:cs typeface="Lucida Sans Unicode" panose="020B0602030504020204" pitchFamily="34" charset="0"/>
               </a:rPr>
-              <a:t>A Responsive Web Design and a Mobile-First approach to development was employed to ensure that the web application remains usable and accessible across a variety of screen sizes to enhance the users experience when using the tool.</a:t>
+              <a:t>A Responsive Web Design and a Mobile-First approach </a:t>
+            </a:r>
+          </a:p>
+          <a:p>
+            <a:r>
+              <a:rPr lang="en-GB" sz="4000" dirty="0">
+                <a:latin typeface="Lucida Sans Unicode" panose="020B0602030504020204" pitchFamily="34" charset="0"/>
+                <a:cs typeface="Lucida Sans Unicode" panose="020B0602030504020204" pitchFamily="34" charset="0"/>
+              </a:rPr>
+              <a:t>to development was employed to ensure that the web application remains usable and accessible across a variety of screen sizes to enhance the users experience when using the tool.</a:t>
             </a:r>
           </a:p>
           <a:p>
@@ -3722,7 +4264,7 @@
           <p:nvPr/>
         </p:nvPicPr>
         <p:blipFill>
-          <a:blip r:embed="rId4">
+          <a:blip r:embed="rId5">
             <a:extLst>
               <a:ext uri="{28A0092B-C50C-407E-A947-70E740481C1C}">
                 <a14:useLocalDpi xmlns:a14="http://schemas.microsoft.com/office/drawing/2010/main" val="0"/>
@@ -3758,7 +4300,7 @@
           <p:nvPr/>
         </p:nvPicPr>
         <p:blipFill>
-          <a:blip r:embed="rId5">
+          <a:blip r:embed="rId6">
             <a:extLst>
               <a:ext uri="{28A0092B-C50C-407E-A947-70E740481C1C}">
                 <a14:useLocalDpi xmlns:a14="http://schemas.microsoft.com/office/drawing/2010/main" val="0"/>
@@ -3794,7 +4336,7 @@
           <p:nvPr/>
         </p:nvPicPr>
         <p:blipFill>
-          <a:blip r:embed="rId6">
+          <a:blip r:embed="rId7">
             <a:extLst>
               <a:ext uri="{28A0092B-C50C-407E-A947-70E740481C1C}">
                 <a14:useLocalDpi xmlns:a14="http://schemas.microsoft.com/office/drawing/2010/main" val="0"/>
@@ -3829,19 +4371,17 @@
         </p:nvSpPr>
         <p:spPr>
           <a:xfrm>
-            <a:off x="1667433" y="720916"/>
-            <a:ext cx="16916403" cy="3629978"/>
+            <a:off x="33375110" y="12828920"/>
+            <a:ext cx="16916403" cy="2911078"/>
           </a:xfrm>
           <a:prstGeom prst="roundRect">
             <a:avLst>
-              <a:gd name="adj" fmla="val 22376"/>
+              <a:gd name="adj" fmla="val 36020"/>
             </a:avLst>
           </a:prstGeom>
           <a:noFill/>
           <a:ln w="38100">
-            <a:solidFill>
-              <a:srgbClr val="2F2F2F"/>
-            </a:solidFill>
+            <a:noFill/>
           </a:ln>
         </p:spPr>
         <p:txBody>
@@ -3852,7 +4392,7 @@
           <a:p>
             <a:pPr algn="ctr"/>
             <a:r>
-              <a:rPr lang="en-GB" sz="4000" dirty="0">
+              <a:rPr lang="en-GB" sz="3600" dirty="0">
                 <a:solidFill>
                   <a:srgbClr val="130E01"/>
                 </a:solidFill>
@@ -3867,7 +4407,7 @@
     </p:spTree>
     <p:extLst>
       <p:ext uri="{BB962C8B-B14F-4D97-AF65-F5344CB8AC3E}">
-        <p14:creationId xmlns:p14="http://schemas.microsoft.com/office/powerpoint/2010/main" val="1396576615"/>
+        <p14:creationId xmlns:p14="http://schemas.microsoft.com/office/powerpoint/2010/main" val="2548535663"/>
       </p:ext>
     </p:extLst>
   </p:cSld>
@@ -4190,4 +4730,319 @@
     </a:ext>
   </a:extLst>
 </a:theme>
+</file>
+
+<file path=ppt/theme/theme2.xml><?xml version="1.0" encoding="utf-8"?>
+<a:theme xmlns:a="http://schemas.openxmlformats.org/drawingml/2006/main" name="Office Theme">
+  <a:themeElements>
+    <a:clrScheme name="Office">
+      <a:dk1>
+        <a:sysClr val="windowText" lastClr="000000"/>
+      </a:dk1>
+      <a:lt1>
+        <a:sysClr val="window" lastClr="FFFFFF"/>
+      </a:lt1>
+      <a:dk2>
+        <a:srgbClr val="0E2841"/>
+      </a:dk2>
+      <a:lt2>
+        <a:srgbClr val="E8E8E8"/>
+      </a:lt2>
+      <a:accent1>
+        <a:srgbClr val="156082"/>
+      </a:accent1>
+      <a:accent2>
+        <a:srgbClr val="E97132"/>
+      </a:accent2>
+      <a:accent3>
+        <a:srgbClr val="196B24"/>
+      </a:accent3>
+      <a:accent4>
+        <a:srgbClr val="0F9ED5"/>
+      </a:accent4>
+      <a:accent5>
+        <a:srgbClr val="A02B93"/>
+      </a:accent5>
+      <a:accent6>
+        <a:srgbClr val="4EA72E"/>
+      </a:accent6>
+      <a:hlink>
+        <a:srgbClr val="467886"/>
+      </a:hlink>
+      <a:folHlink>
+        <a:srgbClr val="96607D"/>
+      </a:folHlink>
+    </a:clrScheme>
+    <a:fontScheme name="Office">
+      <a:majorFont>
+        <a:latin typeface="Aptos Display" panose="02110004020202020204"/>
+        <a:ea typeface=""/>
+        <a:cs typeface=""/>
+        <a:font script="Jpan" typeface="游ゴシック Light"/>
+        <a:font script="Hang" typeface="맑은 고딕"/>
+        <a:font script="Hans" typeface="等线 Light"/>
+        <a:font script="Hant" typeface="新細明體"/>
+        <a:font script="Arab" typeface="Times New Roman"/>
+        <a:font script="Hebr" typeface="Times New Roman"/>
+        <a:font script="Thai" typeface="Angsana New"/>
+        <a:font script="Ethi" typeface="Nyala"/>
+        <a:font script="Beng" typeface="Vrinda"/>
+        <a:font script="Gujr" typeface="Shruti"/>
+        <a:font script="Khmr" typeface="MoolBoran"/>
+        <a:font script="Knda" typeface="Tunga"/>
+        <a:font script="Guru" typeface="Raavi"/>
+        <a:font script="Cans" typeface="Euphemia"/>
+        <a:font script="Cher" typeface="Plantagenet Cherokee"/>
+        <a:font script="Yiii" typeface="Microsoft Yi Baiti"/>
+        <a:font script="Tibt" typeface="Microsoft Himalaya"/>
+        <a:font script="Thaa" typeface="MV Boli"/>
+        <a:font script="Deva" typeface="Mangal"/>
+        <a:font script="Telu" typeface="Gautami"/>
+        <a:font script="Taml" typeface="Latha"/>
+        <a:font script="Syrc" typeface="Estrangelo Edessa"/>
+        <a:font script="Orya" typeface="Kalinga"/>
+        <a:font script="Mlym" typeface="Kartika"/>
+        <a:font script="Laoo" typeface="DokChampa"/>
+        <a:font script="Sinh" typeface="Iskoola Pota"/>
+        <a:font script="Mong" typeface="Mongolian Baiti"/>
+        <a:font script="Viet" typeface="Times New Roman"/>
+        <a:font script="Uigh" typeface="Microsoft Uighur"/>
+        <a:font script="Geor" typeface="Sylfaen"/>
+        <a:font script="Armn" typeface="Arial"/>
+        <a:font script="Bugi" typeface="Leelawadee UI"/>
+        <a:font script="Bopo" typeface="Microsoft JhengHei"/>
+        <a:font script="Java" typeface="Javanese Text"/>
+        <a:font script="Lisu" typeface="Segoe UI"/>
+        <a:font script="Mymr" typeface="Myanmar Text"/>
+        <a:font script="Nkoo" typeface="Ebrima"/>
+        <a:font script="Olck" typeface="Nirmala UI"/>
+        <a:font script="Osma" typeface="Ebrima"/>
+        <a:font script="Phag" typeface="Phagspa"/>
+        <a:font script="Syrn" typeface="Estrangelo Edessa"/>
+        <a:font script="Syrj" typeface="Estrangelo Edessa"/>
+        <a:font script="Syre" typeface="Estrangelo Edessa"/>
+        <a:font script="Sora" typeface="Nirmala UI"/>
+        <a:font script="Tale" typeface="Microsoft Tai Le"/>
+        <a:font script="Talu" typeface="Microsoft New Tai Lue"/>
+        <a:font script="Tfng" typeface="Ebrima"/>
+      </a:majorFont>
+      <a:minorFont>
+        <a:latin typeface="Aptos" panose="02110004020202020204"/>
+        <a:ea typeface=""/>
+        <a:cs typeface=""/>
+        <a:font script="Jpan" typeface="游ゴシック"/>
+        <a:font script="Hang" typeface="맑은 고딕"/>
+        <a:font script="Hans" typeface="等线"/>
+        <a:font script="Hant" typeface="新細明體"/>
+        <a:font script="Arab" typeface="Arial"/>
+        <a:font script="Hebr" typeface="Arial"/>
+        <a:font script="Thai" typeface="Cordia New"/>
+        <a:font script="Ethi" typeface="Nyala"/>
+        <a:font script="Beng" typeface="Vrinda"/>
+        <a:font script="Gujr" typeface="Shruti"/>
+        <a:font script="Khmr" typeface="DaunPenh"/>
+        <a:font script="Knda" typeface="Tunga"/>
+        <a:font script="Guru" typeface="Raavi"/>
+        <a:font script="Cans" typeface="Euphemia"/>
+        <a:font script="Cher" typeface="Plantagenet Cherokee"/>
+        <a:font script="Yiii" typeface="Microsoft Yi Baiti"/>
+        <a:font script="Tibt" typeface="Microsoft Himalaya"/>
+        <a:font script="Thaa" typeface="MV Boli"/>
+        <a:font script="Deva" typeface="Mangal"/>
+        <a:font script="Telu" typeface="Gautami"/>
+        <a:font script="Taml" typeface="Latha"/>
+        <a:font script="Syrc" typeface="Estrangelo Edessa"/>
+        <a:font script="Orya" typeface="Kalinga"/>
+        <a:font script="Mlym" typeface="Kartika"/>
+        <a:font script="Laoo" typeface="DokChampa"/>
+        <a:font script="Sinh" typeface="Iskoola Pota"/>
+        <a:font script="Mong" typeface="Mongolian Baiti"/>
+        <a:font script="Viet" typeface="Arial"/>
+        <a:font script="Uigh" typeface="Microsoft Uighur"/>
+        <a:font script="Geor" typeface="Sylfaen"/>
+        <a:font script="Armn" typeface="Arial"/>
+        <a:font script="Bugi" typeface="Leelawadee UI"/>
+        <a:font script="Bopo" typeface="Microsoft JhengHei"/>
+        <a:font script="Java" typeface="Javanese Text"/>
+        <a:font script="Lisu" typeface="Segoe UI"/>
+        <a:font script="Mymr" typeface="Myanmar Text"/>
+        <a:font script="Nkoo" typeface="Ebrima"/>
+        <a:font script="Olck" typeface="Nirmala UI"/>
+        <a:font script="Osma" typeface="Ebrima"/>
+        <a:font script="Phag" typeface="Phagspa"/>
+        <a:font script="Syrn" typeface="Estrangelo Edessa"/>
+        <a:font script="Syrj" typeface="Estrangelo Edessa"/>
+        <a:font script="Syre" typeface="Estrangelo Edessa"/>
+        <a:font script="Sora" typeface="Nirmala UI"/>
+        <a:font script="Tale" typeface="Microsoft Tai Le"/>
+        <a:font script="Talu" typeface="Microsoft New Tai Lue"/>
+        <a:font script="Tfng" typeface="Ebrima"/>
+      </a:minorFont>
+    </a:fontScheme>
+    <a:fmtScheme name="Office">
+      <a:fillStyleLst>
+        <a:solidFill>
+          <a:schemeClr val="phClr"/>
+        </a:solidFill>
+        <a:gradFill rotWithShape="1">
+          <a:gsLst>
+            <a:gs pos="0">
+              <a:schemeClr val="phClr">
+                <a:lumMod val="110000"/>
+                <a:satMod val="105000"/>
+                <a:tint val="67000"/>
+              </a:schemeClr>
+            </a:gs>
+            <a:gs pos="50000">
+              <a:schemeClr val="phClr">
+                <a:lumMod val="105000"/>
+                <a:satMod val="103000"/>
+                <a:tint val="73000"/>
+              </a:schemeClr>
+            </a:gs>
+            <a:gs pos="100000">
+              <a:schemeClr val="phClr">
+                <a:lumMod val="105000"/>
+                <a:satMod val="109000"/>
+                <a:tint val="81000"/>
+              </a:schemeClr>
+            </a:gs>
+          </a:gsLst>
+          <a:lin ang="5400000" scaled="0"/>
+        </a:gradFill>
+        <a:gradFill rotWithShape="1">
+          <a:gsLst>
+            <a:gs pos="0">
+              <a:schemeClr val="phClr">
+                <a:satMod val="103000"/>
+                <a:lumMod val="102000"/>
+                <a:tint val="94000"/>
+              </a:schemeClr>
+            </a:gs>
+            <a:gs pos="50000">
+              <a:schemeClr val="phClr">
+                <a:satMod val="110000"/>
+                <a:lumMod val="100000"/>
+                <a:shade val="100000"/>
+              </a:schemeClr>
+            </a:gs>
+            <a:gs pos="100000">
+              <a:schemeClr val="phClr">
+                <a:lumMod val="99000"/>
+                <a:satMod val="120000"/>
+                <a:shade val="78000"/>
+              </a:schemeClr>
+            </a:gs>
+          </a:gsLst>
+          <a:lin ang="5400000" scaled="0"/>
+        </a:gradFill>
+      </a:fillStyleLst>
+      <a:lnStyleLst>
+        <a:ln w="12700" cap="flat" cmpd="sng" algn="ctr">
+          <a:solidFill>
+            <a:schemeClr val="phClr"/>
+          </a:solidFill>
+          <a:prstDash val="solid"/>
+          <a:miter lim="800000"/>
+        </a:ln>
+        <a:ln w="19050" cap="flat" cmpd="sng" algn="ctr">
+          <a:solidFill>
+            <a:schemeClr val="phClr"/>
+          </a:solidFill>
+          <a:prstDash val="solid"/>
+          <a:miter lim="800000"/>
+        </a:ln>
+        <a:ln w="25400" cap="flat" cmpd="sng" algn="ctr">
+          <a:solidFill>
+            <a:schemeClr val="phClr"/>
+          </a:solidFill>
+          <a:prstDash val="solid"/>
+          <a:miter lim="800000"/>
+        </a:ln>
+      </a:lnStyleLst>
+      <a:effectStyleLst>
+        <a:effectStyle>
+          <a:effectLst/>
+        </a:effectStyle>
+        <a:effectStyle>
+          <a:effectLst/>
+        </a:effectStyle>
+        <a:effectStyle>
+          <a:effectLst>
+            <a:outerShdw blurRad="57150" dist="19050" dir="5400000" algn="ctr" rotWithShape="0">
+              <a:srgbClr val="000000">
+                <a:alpha val="63000"/>
+              </a:srgbClr>
+            </a:outerShdw>
+          </a:effectLst>
+        </a:effectStyle>
+      </a:effectStyleLst>
+      <a:bgFillStyleLst>
+        <a:solidFill>
+          <a:schemeClr val="phClr"/>
+        </a:solidFill>
+        <a:solidFill>
+          <a:schemeClr val="phClr">
+            <a:tint val="95000"/>
+            <a:satMod val="170000"/>
+          </a:schemeClr>
+        </a:solidFill>
+        <a:gradFill rotWithShape="1">
+          <a:gsLst>
+            <a:gs pos="0">
+              <a:schemeClr val="phClr">
+                <a:tint val="93000"/>
+                <a:satMod val="150000"/>
+                <a:shade val="98000"/>
+                <a:lumMod val="102000"/>
+              </a:schemeClr>
+            </a:gs>
+            <a:gs pos="50000">
+              <a:schemeClr val="phClr">
+                <a:tint val="98000"/>
+                <a:satMod val="130000"/>
+                <a:shade val="90000"/>
+                <a:lumMod val="103000"/>
+              </a:schemeClr>
+            </a:gs>
+            <a:gs pos="100000">
+              <a:schemeClr val="phClr">
+                <a:shade val="63000"/>
+                <a:satMod val="120000"/>
+              </a:schemeClr>
+            </a:gs>
+          </a:gsLst>
+          <a:lin ang="5400000" scaled="0"/>
+        </a:gradFill>
+      </a:bgFillStyleLst>
+    </a:fmtScheme>
+  </a:themeElements>
+  <a:objectDefaults>
+    <a:lnDef>
+      <a:spPr/>
+      <a:bodyPr/>
+      <a:lstStyle/>
+      <a:style>
+        <a:lnRef idx="2">
+          <a:schemeClr val="accent1"/>
+        </a:lnRef>
+        <a:fillRef idx="0">
+          <a:schemeClr val="accent1"/>
+        </a:fillRef>
+        <a:effectRef idx="1">
+          <a:schemeClr val="accent1"/>
+        </a:effectRef>
+        <a:fontRef idx="minor">
+          <a:schemeClr val="tx1"/>
+        </a:fontRef>
+      </a:style>
+    </a:lnDef>
+  </a:objectDefaults>
+  <a:extraClrSchemeLst/>
+  <a:extLst>
+    <a:ext uri="{05A4C25C-085E-4340-85A3-A5531E510DB2}">
+      <thm15:themeFamily xmlns:thm15="http://schemas.microsoft.com/office/thememl/2012/main" name="Office Theme" id="{2E142A2C-CD16-42D6-873A-C26D2A0506FA}" vid="{1BDDFF52-6CD6-40A5-AB3C-68EB2F1E4D0A}"/>
+    </a:ext>
+  </a:extLst>
+</a:theme>
 </file>
</xml_diff>